<commit_message>
Added a comparison image of the difference in moves between V3 and V4 of the notebook and put images into the Powerpoint
</commit_message>
<xml_diff>
--- a/Minimax_Presentation.pptx
+++ b/Minimax_Presentation.pptx
@@ -106,6 +106,11 @@
       </a:defRPr>
     </a:lvl9pPr>
   </p:defaultTextStyle>
+  <p:extLst>
+    <p:ext uri="{EFAFB233-063F-42B5-8137-9DF3F51BA10A}">
+      <p15:sldGuideLst xmlns:p15="http://schemas.microsoft.com/office/powerpoint/2012/main"/>
+    </p:ext>
+  </p:extLst>
 </p:presentation>
 </file>
 
@@ -831,7 +836,7 @@
           <a:p>
             <a:fld id="{97BFF81C-1FCB-4DBA-8044-F1A0FCFD45A6}" type="datetime1">
               <a:rPr lang="en-US" smtClean="0"/>
-              <a:t>5/19/2021</a:t>
+              <a:t>5/20/2021</a:t>
             </a:fld>
             <a:endParaRPr lang="en-US" dirty="0"/>
           </a:p>
@@ -877,7 +882,7 @@
           <a:p>
             <a:fld id="{F3450C42-9A0B-4425-92C2-70FCF7C45734}" type="slidenum">
               <a:rPr lang="en-US" smtClean="0"/>
-              <a:t>‹#›</a:t>
+              <a:t>‹nr.›</a:t>
             </a:fld>
             <a:endParaRPr lang="en-US" dirty="0"/>
           </a:p>
@@ -1087,7 +1092,7 @@
             <a:fld id="{BA543EDD-D0D2-447F-B24F-3717AF4B109D}" type="datetime1">
               <a:rPr lang="en-US" smtClean="0"/>
               <a:pPr/>
-              <a:t>5/19/2021</a:t>
+              <a:t>5/20/2021</a:t>
             </a:fld>
             <a:endParaRPr lang="en-US" dirty="0"/>
           </a:p>
@@ -1134,7 +1139,7 @@
             <a:fld id="{F3450C42-9A0B-4425-92C2-70FCF7C45734}" type="slidenum">
               <a:rPr lang="en-US" smtClean="0"/>
               <a:pPr/>
-              <a:t>‹#›</a:t>
+              <a:t>‹nr.›</a:t>
             </a:fld>
             <a:endParaRPr lang="en-US" dirty="0"/>
           </a:p>
@@ -1408,7 +1413,7 @@
             <a:fld id="{BA543EDD-D0D2-447F-B24F-3717AF4B109D}" type="datetime1">
               <a:rPr lang="en-US" smtClean="0"/>
               <a:pPr/>
-              <a:t>5/19/2021</a:t>
+              <a:t>5/20/2021</a:t>
             </a:fld>
             <a:endParaRPr lang="en-US" dirty="0"/>
           </a:p>
@@ -1455,7 +1460,7 @@
             <a:fld id="{F3450C42-9A0B-4425-92C2-70FCF7C45734}" type="slidenum">
               <a:rPr lang="en-US" smtClean="0"/>
               <a:pPr/>
-              <a:t>‹#›</a:t>
+              <a:t>‹nr.›</a:t>
             </a:fld>
             <a:endParaRPr lang="en-US" dirty="0"/>
           </a:p>
@@ -1756,7 +1761,7 @@
             <a:fld id="{BA543EDD-D0D2-447F-B24F-3717AF4B109D}" type="datetime1">
               <a:rPr lang="en-US" smtClean="0"/>
               <a:pPr/>
-              <a:t>5/19/2021</a:t>
+              <a:t>5/20/2021</a:t>
             </a:fld>
             <a:endParaRPr lang="en-US" dirty="0"/>
           </a:p>
@@ -1803,7 +1808,7 @@
             <a:fld id="{F3450C42-9A0B-4425-92C2-70FCF7C45734}" type="slidenum">
               <a:rPr lang="en-US" smtClean="0"/>
               <a:pPr/>
-              <a:t>‹#›</a:t>
+              <a:t>‹nr.›</a:t>
             </a:fld>
             <a:endParaRPr lang="en-US" dirty="0"/>
           </a:p>
@@ -2077,7 +2082,7 @@
             <a:fld id="{BA543EDD-D0D2-447F-B24F-3717AF4B109D}" type="datetime1">
               <a:rPr lang="en-US" smtClean="0"/>
               <a:pPr/>
-              <a:t>5/19/2021</a:t>
+              <a:t>5/20/2021</a:t>
             </a:fld>
             <a:endParaRPr lang="en-US" dirty="0"/>
           </a:p>
@@ -2124,7 +2129,7 @@
             <a:fld id="{F3450C42-9A0B-4425-92C2-70FCF7C45734}" type="slidenum">
               <a:rPr lang="en-US" smtClean="0"/>
               <a:pPr/>
-              <a:t>‹#›</a:t>
+              <a:t>‹nr.›</a:t>
             </a:fld>
             <a:endParaRPr lang="en-US" dirty="0"/>
           </a:p>
@@ -2477,7 +2482,7 @@
             <a:fld id="{BA543EDD-D0D2-447F-B24F-3717AF4B109D}" type="datetime1">
               <a:rPr lang="en-US" smtClean="0"/>
               <a:pPr/>
-              <a:t>5/19/2021</a:t>
+              <a:t>5/20/2021</a:t>
             </a:fld>
             <a:endParaRPr lang="en-US" dirty="0"/>
           </a:p>
@@ -2524,7 +2529,7 @@
             <a:fld id="{F3450C42-9A0B-4425-92C2-70FCF7C45734}" type="slidenum">
               <a:rPr lang="en-US" smtClean="0"/>
               <a:pPr/>
-              <a:t>‹#›</a:t>
+              <a:t>‹nr.›</a:t>
             </a:fld>
             <a:endParaRPr lang="en-US" dirty="0"/>
           </a:p>
@@ -2653,7 +2658,7 @@
           <a:p>
             <a:fld id="{FB9092B3-2D87-4CDF-B84B-C46E5F5D31F7}" type="datetime1">
               <a:rPr lang="en-US" smtClean="0"/>
-              <a:t>5/19/2021</a:t>
+              <a:t>5/20/2021</a:t>
             </a:fld>
             <a:endParaRPr lang="en-US" dirty="0"/>
           </a:p>
@@ -2699,7 +2704,7 @@
           <a:p>
             <a:fld id="{F3450C42-9A0B-4425-92C2-70FCF7C45734}" type="slidenum">
               <a:rPr lang="en-US" smtClean="0"/>
-              <a:t>‹#›</a:t>
+              <a:t>‹nr.›</a:t>
             </a:fld>
             <a:endParaRPr lang="en-US" dirty="0"/>
           </a:p>
@@ -2837,7 +2842,7 @@
           <a:p>
             <a:fld id="{3D769E57-47B1-47B0-B526-3153E4B1E729}" type="datetime1">
               <a:rPr lang="en-US" smtClean="0"/>
-              <a:t>5/19/2021</a:t>
+              <a:t>5/20/2021</a:t>
             </a:fld>
             <a:endParaRPr lang="en-US" dirty="0"/>
           </a:p>
@@ -2883,7 +2888,7 @@
           <a:p>
             <a:fld id="{F3450C42-9A0B-4425-92C2-70FCF7C45734}" type="slidenum">
               <a:rPr lang="en-US" smtClean="0"/>
-              <a:t>‹#›</a:t>
+              <a:t>‹nr.›</a:t>
             </a:fld>
             <a:endParaRPr lang="en-US" dirty="0"/>
           </a:p>
@@ -3017,7 +3022,7 @@
           <a:p>
             <a:fld id="{5A87773D-8987-489A-A650-3D6F7D5C7C38}" type="datetime1">
               <a:rPr lang="en-US" smtClean="0"/>
-              <a:t>5/19/2021</a:t>
+              <a:t>5/20/2021</a:t>
             </a:fld>
             <a:endParaRPr lang="en-US" dirty="0"/>
           </a:p>
@@ -3063,7 +3068,7 @@
           <a:p>
             <a:fld id="{F3450C42-9A0B-4425-92C2-70FCF7C45734}" type="slidenum">
               <a:rPr lang="en-US" smtClean="0"/>
-              <a:t>‹#›</a:t>
+              <a:t>‹nr.›</a:t>
             </a:fld>
             <a:endParaRPr lang="en-US" dirty="0"/>
           </a:p>
@@ -3268,7 +3273,7 @@
           <a:p>
             <a:fld id="{97E150C1-1D78-4D80-810D-E9E86F6E88AB}" type="datetime1">
               <a:rPr lang="en-US" smtClean="0"/>
-              <a:t>5/19/2021</a:t>
+              <a:t>5/20/2021</a:t>
             </a:fld>
             <a:endParaRPr lang="en-US" dirty="0"/>
           </a:p>
@@ -3314,7 +3319,7 @@
           <a:p>
             <a:fld id="{F3450C42-9A0B-4425-92C2-70FCF7C45734}" type="slidenum">
               <a:rPr lang="en-US" smtClean="0"/>
-              <a:t>‹#›</a:t>
+              <a:t>‹nr.›</a:t>
             </a:fld>
             <a:endParaRPr lang="en-US" dirty="0"/>
           </a:p>
@@ -3504,7 +3509,7 @@
           <a:p>
             <a:fld id="{29E9CBD8-1588-4B6B-B74D-87480DDE94C0}" type="datetime1">
               <a:rPr lang="en-US" smtClean="0"/>
-              <a:t>5/19/2021</a:t>
+              <a:t>5/20/2021</a:t>
             </a:fld>
             <a:endParaRPr lang="en-US" dirty="0"/>
           </a:p>
@@ -3550,7 +3555,7 @@
           <a:p>
             <a:fld id="{F3450C42-9A0B-4425-92C2-70FCF7C45734}" type="slidenum">
               <a:rPr lang="en-US" smtClean="0"/>
-              <a:t>‹#›</a:t>
+              <a:t>‹nr.›</a:t>
             </a:fld>
             <a:endParaRPr lang="en-US" dirty="0"/>
           </a:p>
@@ -3882,7 +3887,7 @@
           <a:p>
             <a:fld id="{AD794440-721C-4D75-BD4F-4CFB3D51CDCA}" type="datetime1">
               <a:rPr lang="en-US" smtClean="0"/>
-              <a:t>5/19/2021</a:t>
+              <a:t>5/20/2021</a:t>
             </a:fld>
             <a:endParaRPr lang="en-US" dirty="0"/>
           </a:p>
@@ -3928,7 +3933,7 @@
           <a:p>
             <a:fld id="{F3450C42-9A0B-4425-92C2-70FCF7C45734}" type="slidenum">
               <a:rPr lang="en-US" smtClean="0"/>
-              <a:t>‹#›</a:t>
+              <a:t>‹nr.›</a:t>
             </a:fld>
             <a:endParaRPr lang="en-US" dirty="0"/>
           </a:p>
@@ -4009,7 +4014,7 @@
           <a:p>
             <a:fld id="{B2701A64-483B-4532-94FB-D8F90CB6DEE0}" type="datetime1">
               <a:rPr lang="en-US" smtClean="0"/>
-              <a:t>5/19/2021</a:t>
+              <a:t>5/20/2021</a:t>
             </a:fld>
             <a:endParaRPr lang="en-US" dirty="0"/>
           </a:p>
@@ -4055,7 +4060,7 @@
           <a:p>
             <a:fld id="{F3450C42-9A0B-4425-92C2-70FCF7C45734}" type="slidenum">
               <a:rPr lang="en-US" smtClean="0"/>
-              <a:t>‹#›</a:t>
+              <a:t>‹nr.›</a:t>
             </a:fld>
             <a:endParaRPr lang="en-US" dirty="0"/>
           </a:p>
@@ -4108,7 +4113,7 @@
           <a:p>
             <a:fld id="{6F18FB39-20FB-4E2E-B861-45B709B9C3C5}" type="datetime1">
               <a:rPr lang="en-US" smtClean="0"/>
-              <a:t>5/19/2021</a:t>
+              <a:t>5/20/2021</a:t>
             </a:fld>
             <a:endParaRPr lang="en-US" dirty="0"/>
           </a:p>
@@ -4154,7 +4159,7 @@
           <a:p>
             <a:fld id="{F3450C42-9A0B-4425-92C2-70FCF7C45734}" type="slidenum">
               <a:rPr lang="en-US" smtClean="0"/>
-              <a:t>‹#›</a:t>
+              <a:t>‹nr.›</a:t>
             </a:fld>
             <a:endParaRPr lang="en-US" dirty="0"/>
           </a:p>
@@ -4367,7 +4372,7 @@
           <a:p>
             <a:fld id="{AC48AC19-8BD6-476C-9770-8884373BCF00}" type="datetime1">
               <a:rPr lang="en-US" smtClean="0"/>
-              <a:t>5/19/2021</a:t>
+              <a:t>5/20/2021</a:t>
             </a:fld>
             <a:endParaRPr lang="en-US"/>
           </a:p>
@@ -4413,7 +4418,7 @@
           <a:p>
             <a:fld id="{F3450C42-9A0B-4425-92C2-70FCF7C45734}" type="slidenum">
               <a:rPr lang="en-US" smtClean="0"/>
-              <a:t>‹#›</a:t>
+              <a:t>‹nr.›</a:t>
             </a:fld>
             <a:endParaRPr lang="en-US" dirty="0"/>
           </a:p>
@@ -4634,7 +4639,7 @@
           <a:p>
             <a:fld id="{F3F68C53-8AD1-4F09-9486-FB3406B99CFA}" type="datetime1">
               <a:rPr lang="en-US" smtClean="0"/>
-              <a:t>5/19/2021</a:t>
+              <a:t>5/20/2021</a:t>
             </a:fld>
             <a:endParaRPr lang="en-US" dirty="0"/>
           </a:p>
@@ -4680,7 +4685,7 @@
           <a:p>
             <a:fld id="{F3450C42-9A0B-4425-92C2-70FCF7C45734}" type="slidenum">
               <a:rPr lang="en-US" smtClean="0"/>
-              <a:t>‹#›</a:t>
+              <a:t>‹nr.›</a:t>
             </a:fld>
             <a:endParaRPr lang="en-US" dirty="0"/>
           </a:p>
@@ -5382,7 +5387,7 @@
             <a:fld id="{BA543EDD-D0D2-447F-B24F-3717AF4B109D}" type="datetime1">
               <a:rPr lang="en-US" smtClean="0"/>
               <a:pPr/>
-              <a:t>5/19/2021</a:t>
+              <a:t>5/20/2021</a:t>
             </a:fld>
             <a:endParaRPr lang="en-US" dirty="0"/>
           </a:p>
@@ -5463,7 +5468,7 @@
             <a:fld id="{F3450C42-9A0B-4425-92C2-70FCF7C45734}" type="slidenum">
               <a:rPr lang="en-US" smtClean="0"/>
               <a:pPr/>
-              <a:t>‹#›</a:t>
+              <a:t>‹nr.›</a:t>
             </a:fld>
             <a:endParaRPr lang="en-US" dirty="0"/>
           </a:p>
@@ -6153,6 +6158,78 @@
           </a:p>
         </p:txBody>
       </p:sp>
+      <p:pic>
+        <p:nvPicPr>
+          <p:cNvPr id="5" name="Billede 4">
+            <a:extLst>
+              <a:ext uri="{FF2B5EF4-FFF2-40B4-BE49-F238E27FC236}">
+                <a16:creationId xmlns:a16="http://schemas.microsoft.com/office/drawing/2014/main" id="{C9B0721E-E245-47F7-A45E-F2D88AF9AE3F}"/>
+              </a:ext>
+            </a:extLst>
+          </p:cNvPr>
+          <p:cNvPicPr>
+            <a:picLocks noChangeAspect="1"/>
+          </p:cNvPicPr>
+          <p:nvPr/>
+        </p:nvPicPr>
+        <p:blipFill>
+          <a:blip r:embed="rId2">
+            <a:extLst>
+              <a:ext uri="{28A0092B-C50C-407E-A947-70E740481C1C}">
+                <a14:useLocalDpi xmlns:a14="http://schemas.microsoft.com/office/drawing/2010/main" val="0"/>
+              </a:ext>
+            </a:extLst>
+          </a:blip>
+          <a:stretch>
+            <a:fillRect/>
+          </a:stretch>
+        </p:blipFill>
+        <p:spPr>
+          <a:xfrm>
+            <a:off x="900625" y="4391284"/>
+            <a:ext cx="4075043" cy="1857116"/>
+          </a:xfrm>
+          <a:prstGeom prst="rect">
+            <a:avLst/>
+          </a:prstGeom>
+        </p:spPr>
+      </p:pic>
+      <p:pic>
+        <p:nvPicPr>
+          <p:cNvPr id="7" name="Billede 6">
+            <a:extLst>
+              <a:ext uri="{FF2B5EF4-FFF2-40B4-BE49-F238E27FC236}">
+                <a16:creationId xmlns:a16="http://schemas.microsoft.com/office/drawing/2014/main" id="{07C6577E-2018-4C53-8777-9DF8FA57C89B}"/>
+              </a:ext>
+            </a:extLst>
+          </p:cNvPr>
+          <p:cNvPicPr>
+            <a:picLocks noChangeAspect="1"/>
+          </p:cNvPicPr>
+          <p:nvPr/>
+        </p:nvPicPr>
+        <p:blipFill>
+          <a:blip r:embed="rId3">
+            <a:extLst>
+              <a:ext uri="{28A0092B-C50C-407E-A947-70E740481C1C}">
+                <a14:useLocalDpi xmlns:a14="http://schemas.microsoft.com/office/drawing/2010/main" val="0"/>
+              </a:ext>
+            </a:extLst>
+          </a:blip>
+          <a:stretch>
+            <a:fillRect/>
+          </a:stretch>
+        </p:blipFill>
+        <p:spPr>
+          <a:xfrm>
+            <a:off x="5733991" y="4391284"/>
+            <a:ext cx="2781688" cy="1933845"/>
+          </a:xfrm>
+          <a:prstGeom prst="rect">
+            <a:avLst/>
+          </a:prstGeom>
+        </p:spPr>
+      </p:pic>
     </p:spTree>
     <p:extLst>
       <p:ext uri="{BB962C8B-B14F-4D97-AF65-F5344CB8AC3E}">
@@ -6368,6 +6445,78 @@
           </a:p>
         </p:txBody>
       </p:sp>
+      <p:pic>
+        <p:nvPicPr>
+          <p:cNvPr id="5" name="Billede 4" descr="Et billede, der indeholder shoji, bygning, træ&#10;&#10;Automatisk genereret beskrivelse">
+            <a:extLst>
+              <a:ext uri="{FF2B5EF4-FFF2-40B4-BE49-F238E27FC236}">
+                <a16:creationId xmlns:a16="http://schemas.microsoft.com/office/drawing/2014/main" id="{F45C8C30-51C2-4E31-80DA-E076784C85F9}"/>
+              </a:ext>
+            </a:extLst>
+          </p:cNvPr>
+          <p:cNvPicPr>
+            <a:picLocks noChangeAspect="1"/>
+          </p:cNvPicPr>
+          <p:nvPr/>
+        </p:nvPicPr>
+        <p:blipFill>
+          <a:blip r:embed="rId2">
+            <a:extLst>
+              <a:ext uri="{28A0092B-C50C-407E-A947-70E740481C1C}">
+                <a14:useLocalDpi xmlns:a14="http://schemas.microsoft.com/office/drawing/2010/main" val="0"/>
+              </a:ext>
+            </a:extLst>
+          </a:blip>
+          <a:stretch>
+            <a:fillRect/>
+          </a:stretch>
+        </p:blipFill>
+        <p:spPr>
+          <a:xfrm>
+            <a:off x="7882525" y="2511287"/>
+            <a:ext cx="1391477" cy="1391477"/>
+          </a:xfrm>
+          <a:prstGeom prst="rect">
+            <a:avLst/>
+          </a:prstGeom>
+        </p:spPr>
+      </p:pic>
+      <p:pic>
+        <p:nvPicPr>
+          <p:cNvPr id="7" name="Billede 6" descr="Et billede, der indeholder tekst&#10;&#10;Automatisk genereret beskrivelse">
+            <a:extLst>
+              <a:ext uri="{FF2B5EF4-FFF2-40B4-BE49-F238E27FC236}">
+                <a16:creationId xmlns:a16="http://schemas.microsoft.com/office/drawing/2014/main" id="{3DDF981C-142C-413D-A9C7-1F477077C3D0}"/>
+              </a:ext>
+            </a:extLst>
+          </p:cNvPr>
+          <p:cNvPicPr>
+            <a:picLocks noChangeAspect="1"/>
+          </p:cNvPicPr>
+          <p:nvPr/>
+        </p:nvPicPr>
+        <p:blipFill>
+          <a:blip r:embed="rId3">
+            <a:extLst>
+              <a:ext uri="{28A0092B-C50C-407E-A947-70E740481C1C}">
+                <a14:useLocalDpi xmlns:a14="http://schemas.microsoft.com/office/drawing/2010/main" val="0"/>
+              </a:ext>
+            </a:extLst>
+          </a:blip>
+          <a:stretch>
+            <a:fillRect/>
+          </a:stretch>
+        </p:blipFill>
+        <p:spPr>
+          <a:xfrm>
+            <a:off x="5092117" y="4132954"/>
+            <a:ext cx="4131396" cy="1391477"/>
+          </a:xfrm>
+          <a:prstGeom prst="rect">
+            <a:avLst/>
+          </a:prstGeom>
+        </p:spPr>
+      </p:pic>
     </p:spTree>
     <p:extLst>
       <p:ext uri="{BB962C8B-B14F-4D97-AF65-F5344CB8AC3E}">

</xml_diff>

<commit_message>
Made References Appear Out of Thin Air
</commit_message>
<xml_diff>
--- a/Minimax_Presentation.pptx
+++ b/Minimax_Presentation.pptx
@@ -836,7 +836,7 @@
           <a:p>
             <a:fld id="{97BFF81C-1FCB-4DBA-8044-F1A0FCFD45A6}" type="datetime1">
               <a:rPr lang="en-US" smtClean="0"/>
-              <a:t>5/20/2021</a:t>
+              <a:t>5/21/2021</a:t>
             </a:fld>
             <a:endParaRPr lang="en-US" dirty="0"/>
           </a:p>
@@ -1092,7 +1092,7 @@
             <a:fld id="{BA543EDD-D0D2-447F-B24F-3717AF4B109D}" type="datetime1">
               <a:rPr lang="en-US" smtClean="0"/>
               <a:pPr/>
-              <a:t>5/20/2021</a:t>
+              <a:t>5/21/2021</a:t>
             </a:fld>
             <a:endParaRPr lang="en-US" dirty="0"/>
           </a:p>
@@ -1413,7 +1413,7 @@
             <a:fld id="{BA543EDD-D0D2-447F-B24F-3717AF4B109D}" type="datetime1">
               <a:rPr lang="en-US" smtClean="0"/>
               <a:pPr/>
-              <a:t>5/20/2021</a:t>
+              <a:t>5/21/2021</a:t>
             </a:fld>
             <a:endParaRPr lang="en-US" dirty="0"/>
           </a:p>
@@ -1761,7 +1761,7 @@
             <a:fld id="{BA543EDD-D0D2-447F-B24F-3717AF4B109D}" type="datetime1">
               <a:rPr lang="en-US" smtClean="0"/>
               <a:pPr/>
-              <a:t>5/20/2021</a:t>
+              <a:t>5/21/2021</a:t>
             </a:fld>
             <a:endParaRPr lang="en-US" dirty="0"/>
           </a:p>
@@ -2082,7 +2082,7 @@
             <a:fld id="{BA543EDD-D0D2-447F-B24F-3717AF4B109D}" type="datetime1">
               <a:rPr lang="en-US" smtClean="0"/>
               <a:pPr/>
-              <a:t>5/20/2021</a:t>
+              <a:t>5/21/2021</a:t>
             </a:fld>
             <a:endParaRPr lang="en-US" dirty="0"/>
           </a:p>
@@ -2482,7 +2482,7 @@
             <a:fld id="{BA543EDD-D0D2-447F-B24F-3717AF4B109D}" type="datetime1">
               <a:rPr lang="en-US" smtClean="0"/>
               <a:pPr/>
-              <a:t>5/20/2021</a:t>
+              <a:t>5/21/2021</a:t>
             </a:fld>
             <a:endParaRPr lang="en-US" dirty="0"/>
           </a:p>
@@ -2658,7 +2658,7 @@
           <a:p>
             <a:fld id="{FB9092B3-2D87-4CDF-B84B-C46E5F5D31F7}" type="datetime1">
               <a:rPr lang="en-US" smtClean="0"/>
-              <a:t>5/20/2021</a:t>
+              <a:t>5/21/2021</a:t>
             </a:fld>
             <a:endParaRPr lang="en-US" dirty="0"/>
           </a:p>
@@ -2842,7 +2842,7 @@
           <a:p>
             <a:fld id="{3D769E57-47B1-47B0-B526-3153E4B1E729}" type="datetime1">
               <a:rPr lang="en-US" smtClean="0"/>
-              <a:t>5/20/2021</a:t>
+              <a:t>5/21/2021</a:t>
             </a:fld>
             <a:endParaRPr lang="en-US" dirty="0"/>
           </a:p>
@@ -3022,7 +3022,7 @@
           <a:p>
             <a:fld id="{5A87773D-8987-489A-A650-3D6F7D5C7C38}" type="datetime1">
               <a:rPr lang="en-US" smtClean="0"/>
-              <a:t>5/20/2021</a:t>
+              <a:t>5/21/2021</a:t>
             </a:fld>
             <a:endParaRPr lang="en-US" dirty="0"/>
           </a:p>
@@ -3273,7 +3273,7 @@
           <a:p>
             <a:fld id="{97E150C1-1D78-4D80-810D-E9E86F6E88AB}" type="datetime1">
               <a:rPr lang="en-US" smtClean="0"/>
-              <a:t>5/20/2021</a:t>
+              <a:t>5/21/2021</a:t>
             </a:fld>
             <a:endParaRPr lang="en-US" dirty="0"/>
           </a:p>
@@ -3509,7 +3509,7 @@
           <a:p>
             <a:fld id="{29E9CBD8-1588-4B6B-B74D-87480DDE94C0}" type="datetime1">
               <a:rPr lang="en-US" smtClean="0"/>
-              <a:t>5/20/2021</a:t>
+              <a:t>5/21/2021</a:t>
             </a:fld>
             <a:endParaRPr lang="en-US" dirty="0"/>
           </a:p>
@@ -3887,7 +3887,7 @@
           <a:p>
             <a:fld id="{AD794440-721C-4D75-BD4F-4CFB3D51CDCA}" type="datetime1">
               <a:rPr lang="en-US" smtClean="0"/>
-              <a:t>5/20/2021</a:t>
+              <a:t>5/21/2021</a:t>
             </a:fld>
             <a:endParaRPr lang="en-US" dirty="0"/>
           </a:p>
@@ -4014,7 +4014,7 @@
           <a:p>
             <a:fld id="{B2701A64-483B-4532-94FB-D8F90CB6DEE0}" type="datetime1">
               <a:rPr lang="en-US" smtClean="0"/>
-              <a:t>5/20/2021</a:t>
+              <a:t>5/21/2021</a:t>
             </a:fld>
             <a:endParaRPr lang="en-US" dirty="0"/>
           </a:p>
@@ -4113,7 +4113,7 @@
           <a:p>
             <a:fld id="{6F18FB39-20FB-4E2E-B861-45B709B9C3C5}" type="datetime1">
               <a:rPr lang="en-US" smtClean="0"/>
-              <a:t>5/20/2021</a:t>
+              <a:t>5/21/2021</a:t>
             </a:fld>
             <a:endParaRPr lang="en-US" dirty="0"/>
           </a:p>
@@ -4372,7 +4372,7 @@
           <a:p>
             <a:fld id="{AC48AC19-8BD6-476C-9770-8884373BCF00}" type="datetime1">
               <a:rPr lang="en-US" smtClean="0"/>
-              <a:t>5/20/2021</a:t>
+              <a:t>5/21/2021</a:t>
             </a:fld>
             <a:endParaRPr lang="en-US"/>
           </a:p>
@@ -4639,7 +4639,7 @@
           <a:p>
             <a:fld id="{F3F68C53-8AD1-4F09-9486-FB3406B99CFA}" type="datetime1">
               <a:rPr lang="en-US" smtClean="0"/>
-              <a:t>5/20/2021</a:t>
+              <a:t>5/21/2021</a:t>
             </a:fld>
             <a:endParaRPr lang="en-US" dirty="0"/>
           </a:p>
@@ -5387,7 +5387,7 @@
             <a:fld id="{BA543EDD-D0D2-447F-B24F-3717AF4B109D}" type="datetime1">
               <a:rPr lang="en-US" smtClean="0"/>
               <a:pPr/>
-              <a:t>5/20/2021</a:t>
+              <a:t>5/21/2021</a:t>
             </a:fld>
             <a:endParaRPr lang="en-US" dirty="0"/>
           </a:p>
@@ -6412,37 +6412,6 @@
               <a:t> – 80% - 93%</a:t>
             </a:r>
           </a:p>
-          <a:p>
-            <a:r>
-              <a:rPr lang="en-US" dirty="0" err="1"/>
-              <a:t>Fremtidige</a:t>
-            </a:r>
-            <a:r>
-              <a:rPr lang="en-US" dirty="0"/>
-              <a:t> </a:t>
-            </a:r>
-            <a:r>
-              <a:rPr lang="en-US" dirty="0" err="1"/>
-              <a:t>undersøgelser</a:t>
-            </a:r>
-            <a:r>
-              <a:rPr lang="en-US" dirty="0"/>
-              <a:t> – </a:t>
-            </a:r>
-            <a:r>
-              <a:rPr lang="en-US" dirty="0" err="1"/>
-              <a:t>andre</a:t>
-            </a:r>
-            <a:r>
-              <a:rPr lang="en-US" dirty="0"/>
-              <a:t> </a:t>
-            </a:r>
-            <a:r>
-              <a:rPr lang="en-US" dirty="0" err="1"/>
-              <a:t>spil</a:t>
-            </a:r>
-            <a:endParaRPr lang="en-US" dirty="0"/>
-          </a:p>
         </p:txBody>
       </p:sp>
       <p:pic>
@@ -6473,7 +6442,7 @@
         </p:blipFill>
         <p:spPr>
           <a:xfrm>
-            <a:off x="7882525" y="2511287"/>
+            <a:off x="7882525" y="3902763"/>
             <a:ext cx="1391477" cy="1391477"/>
           </a:xfrm>
           <a:prstGeom prst="rect">
@@ -6509,7 +6478,7 @@
         </p:blipFill>
         <p:spPr>
           <a:xfrm>
-            <a:off x="5092117" y="4132954"/>
+            <a:off x="1068757" y="3902764"/>
             <a:ext cx="4131396" cy="1391477"/>
           </a:xfrm>
           <a:prstGeom prst="rect">

</xml_diff>